<commit_message>
calculated several v-v correlation
</commit_message>
<xml_diff>
--- a/Reports/results on 9.18.pptx
+++ b/Reports/results on 9.18.pptx
@@ -7,6 +7,8 @@
   <p:sldIdLst>
     <p:sldId id="256" r:id="rId2"/>
     <p:sldId id="258" r:id="rId3"/>
+    <p:sldId id="259" r:id="rId4"/>
+    <p:sldId id="260" r:id="rId5"/>
   </p:sldIdLst>
   <p:sldSz cx="12192000" cy="6858000"/>
   <p:notesSz cx="6858000" cy="9144000"/>
@@ -3342,7 +3344,7 @@
         <p:spPr>
           <a:xfrm>
             <a:off x="642938" y="542925"/>
-            <a:ext cx="1642566" cy="369332"/>
+            <a:ext cx="1927900" cy="369332"/>
           </a:xfrm>
           <a:prstGeom prst="rect">
             <a:avLst/>
@@ -3357,7 +3359,7 @@
           <a:p>
             <a:r>
               <a:rPr lang="en-US" dirty="0"/>
-              <a:t>Results on 9/18</a:t>
+              <a:t>Results on 9/18 #1</a:t>
             </a:r>
           </a:p>
         </p:txBody>
@@ -4054,7 +4056,7 @@
         <p:spPr>
           <a:xfrm>
             <a:off x="4629150" y="119003"/>
-            <a:ext cx="6335389" cy="1754326"/>
+            <a:ext cx="6335389" cy="2492990"/>
           </a:xfrm>
           <a:prstGeom prst="rect">
             <a:avLst/>
@@ -4107,6 +4109,51 @@
               <a:rPr lang="en-US" sz="1200" dirty="0"/>
               <a:t>0.22620524345310436, 0.22347344505144076]</a:t>
             </a:r>
+          </a:p>
+          <a:p>
+            <a:r>
+              <a:rPr lang="en-US" dirty="0"/>
+              <a:t>Decay rate (</a:t>
+            </a:r>
+            <a:r>
+              <a:rPr lang="el-GR" dirty="0">
+                <a:latin typeface="Calibri" panose="020F0502020204030204" pitchFamily="34" charset="0"/>
+                <a:cs typeface="Calibri" panose="020F0502020204030204" pitchFamily="34" charset="0"/>
+              </a:rPr>
+              <a:t>τ</a:t>
+            </a:r>
+            <a:r>
+              <a:rPr lang="en-US" baseline="30000" dirty="0">
+                <a:latin typeface="Calibri" panose="020F0502020204030204" pitchFamily="34" charset="0"/>
+                <a:cs typeface="Calibri" panose="020F0502020204030204" pitchFamily="34" charset="0"/>
+              </a:rPr>
+              <a:t>-1</a:t>
+            </a:r>
+            <a:r>
+              <a:rPr lang="en-US" dirty="0">
+                <a:latin typeface="Calibri" panose="020F0502020204030204" pitchFamily="34" charset="0"/>
+                <a:cs typeface="Calibri" panose="020F0502020204030204" pitchFamily="34" charset="0"/>
+              </a:rPr>
+              <a:t>)</a:t>
+            </a:r>
+            <a:r>
+              <a:rPr lang="en-US" dirty="0"/>
+              <a:t> = 2.85</a:t>
+            </a:r>
+          </a:p>
+          <a:p>
+            <a:r>
+              <a:rPr lang="en-US" dirty="0" err="1"/>
+              <a:t>v_rms</a:t>
+            </a:r>
+            <a:r>
+              <a:rPr lang="en-US" dirty="0"/>
+              <a:t> = 0.6712</a:t>
+            </a:r>
+            <a:endParaRPr lang="en-US" sz="1200" dirty="0"/>
+          </a:p>
+          <a:p>
+            <a:endParaRPr lang="en-US" sz="1200" dirty="0"/>
           </a:p>
         </p:txBody>
       </p:sp>
@@ -4389,10 +4436,1316 @@
           </a:p>
         </p:txBody>
       </p:sp>
+      <p:sp>
+        <p:nvSpPr>
+          <p:cNvPr id="10" name="TextBox 9">
+            <a:extLst>
+              <a:ext uri="{FF2B5EF4-FFF2-40B4-BE49-F238E27FC236}">
+                <a16:creationId xmlns:a16="http://schemas.microsoft.com/office/drawing/2014/main" id="{502D9DC5-E02E-47D5-AD2A-FCEF63E472E6}"/>
+              </a:ext>
+            </a:extLst>
+          </p:cNvPr>
+          <p:cNvSpPr txBox="1"/>
+          <p:nvPr/>
+        </p:nvSpPr>
+        <p:spPr>
+          <a:xfrm>
+            <a:off x="8696325" y="119003"/>
+            <a:ext cx="2026517" cy="369332"/>
+          </a:xfrm>
+          <a:prstGeom prst="rect">
+            <a:avLst/>
+          </a:prstGeom>
+          <a:noFill/>
+        </p:spPr>
+        <p:txBody>
+          <a:bodyPr wrap="none" rtlCol="0">
+            <a:spAutoFit/>
+          </a:bodyPr>
+          <a:lstStyle/>
+          <a:p>
+            <a:r>
+              <a:rPr lang="en-US" dirty="0"/>
+              <a:t>N </a:t>
+            </a:r>
+            <a:r>
+              <a:rPr lang="el-GR" dirty="0">
+                <a:latin typeface="Calibri" panose="020F0502020204030204" pitchFamily="34" charset="0"/>
+                <a:cs typeface="Calibri" panose="020F0502020204030204" pitchFamily="34" charset="0"/>
+              </a:rPr>
+              <a:t>τ</a:t>
+            </a:r>
+            <a:r>
+              <a:rPr lang="en-US" dirty="0">
+                <a:latin typeface="Calibri" panose="020F0502020204030204" pitchFamily="34" charset="0"/>
+                <a:cs typeface="Calibri" panose="020F0502020204030204" pitchFamily="34" charset="0"/>
+              </a:rPr>
+              <a:t> (</a:t>
+            </a:r>
+            <a:r>
+              <a:rPr lang="en-US" dirty="0" err="1"/>
+              <a:t>v</a:t>
+            </a:r>
+            <a:r>
+              <a:rPr lang="en-US" baseline="-25000" dirty="0" err="1"/>
+              <a:t>rms</a:t>
+            </a:r>
+            <a:r>
+              <a:rPr lang="en-US" dirty="0"/>
+              <a:t>/R) =  2.355</a:t>
+            </a:r>
+          </a:p>
+        </p:txBody>
+      </p:sp>
     </p:spTree>
     <p:extLst>
       <p:ext uri="{BB962C8B-B14F-4D97-AF65-F5344CB8AC3E}">
         <p14:creationId xmlns:p14="http://schemas.microsoft.com/office/powerpoint/2010/main" val="2847153101"/>
+      </p:ext>
+    </p:extLst>
+  </p:cSld>
+  <p:clrMapOvr>
+    <a:masterClrMapping/>
+  </p:clrMapOvr>
+</p:sld>
+</file>
+
+<file path=ppt/slides/slide3.xml><?xml version="1.0" encoding="utf-8"?>
+<p:sld xmlns:a="http://schemas.openxmlformats.org/drawingml/2006/main" xmlns:r="http://schemas.openxmlformats.org/officeDocument/2006/relationships" xmlns:p="http://schemas.openxmlformats.org/presentationml/2006/main">
+  <p:cSld>
+    <p:spTree>
+      <p:nvGrpSpPr>
+        <p:cNvPr id="1" name=""/>
+        <p:cNvGrpSpPr/>
+        <p:nvPr/>
+      </p:nvGrpSpPr>
+      <p:grpSpPr>
+        <a:xfrm>
+          <a:off x="0" y="0"/>
+          <a:ext cx="0" cy="0"/>
+          <a:chOff x="0" y="0"/>
+          <a:chExt cx="0" cy="0"/>
+        </a:xfrm>
+      </p:grpSpPr>
+      <p:pic>
+        <p:nvPicPr>
+          <p:cNvPr id="2" name="Picture 1">
+            <a:extLst>
+              <a:ext uri="{FF2B5EF4-FFF2-40B4-BE49-F238E27FC236}">
+                <a16:creationId xmlns:a16="http://schemas.microsoft.com/office/drawing/2014/main" id="{E4A2312E-EB42-4136-BD28-11FD109A463E}"/>
+              </a:ext>
+            </a:extLst>
+          </p:cNvPr>
+          <p:cNvPicPr>
+            <a:picLocks noChangeAspect="1"/>
+          </p:cNvPicPr>
+          <p:nvPr/>
+        </p:nvPicPr>
+        <p:blipFill>
+          <a:blip r:embed="rId2"/>
+          <a:stretch>
+            <a:fillRect/>
+          </a:stretch>
+        </p:blipFill>
+        <p:spPr>
+          <a:xfrm>
+            <a:off x="642938" y="4288929"/>
+            <a:ext cx="3870557" cy="2492454"/>
+          </a:xfrm>
+          <a:prstGeom prst="rect">
+            <a:avLst/>
+          </a:prstGeom>
+        </p:spPr>
+      </p:pic>
+      <p:sp>
+        <p:nvSpPr>
+          <p:cNvPr id="4" name="TextBox 3">
+            <a:extLst>
+              <a:ext uri="{FF2B5EF4-FFF2-40B4-BE49-F238E27FC236}">
+                <a16:creationId xmlns:a16="http://schemas.microsoft.com/office/drawing/2014/main" id="{66E16E74-FD64-4056-A5E6-2B5958673682}"/>
+              </a:ext>
+            </a:extLst>
+          </p:cNvPr>
+          <p:cNvSpPr txBox="1"/>
+          <p:nvPr/>
+        </p:nvSpPr>
+        <p:spPr>
+          <a:xfrm>
+            <a:off x="642938" y="542925"/>
+            <a:ext cx="1927900" cy="369332"/>
+          </a:xfrm>
+          <a:prstGeom prst="rect">
+            <a:avLst/>
+          </a:prstGeom>
+          <a:noFill/>
+        </p:spPr>
+        <p:txBody>
+          <a:bodyPr wrap="none" rtlCol="0">
+            <a:spAutoFit/>
+          </a:bodyPr>
+          <a:lstStyle/>
+          <a:p>
+            <a:r>
+              <a:rPr lang="en-US" dirty="0"/>
+              <a:t>Results on 9/18</a:t>
+            </a:r>
+            <a:r>
+              <a:rPr lang="zh-TW" altLang="en-US" dirty="0"/>
+              <a:t> </a:t>
+            </a:r>
+            <a:r>
+              <a:rPr lang="en-US" altLang="zh-TW" dirty="0"/>
+              <a:t>#2</a:t>
+            </a:r>
+            <a:endParaRPr lang="en-US" dirty="0"/>
+          </a:p>
+        </p:txBody>
+      </p:sp>
+      <p:sp>
+        <p:nvSpPr>
+          <p:cNvPr id="5" name="TextBox 4">
+            <a:extLst>
+              <a:ext uri="{FF2B5EF4-FFF2-40B4-BE49-F238E27FC236}">
+                <a16:creationId xmlns:a16="http://schemas.microsoft.com/office/drawing/2014/main" id="{9EB1C12E-A12B-43D5-91EC-D475E95D5691}"/>
+              </a:ext>
+            </a:extLst>
+          </p:cNvPr>
+          <p:cNvSpPr txBox="1"/>
+          <p:nvPr/>
+        </p:nvSpPr>
+        <p:spPr>
+          <a:xfrm>
+            <a:off x="642938" y="1057275"/>
+            <a:ext cx="2138406" cy="1754326"/>
+          </a:xfrm>
+          <a:prstGeom prst="rect">
+            <a:avLst/>
+          </a:prstGeom>
+          <a:noFill/>
+        </p:spPr>
+        <p:txBody>
+          <a:bodyPr wrap="none" rtlCol="0">
+            <a:spAutoFit/>
+          </a:bodyPr>
+          <a:lstStyle/>
+          <a:p>
+            <a:r>
+              <a:rPr lang="en-US" dirty="0"/>
+              <a:t>Parameters:</a:t>
+            </a:r>
+          </a:p>
+          <a:p>
+            <a:r>
+              <a:rPr lang="en-US" dirty="0" err="1"/>
+              <a:t>N_balls</a:t>
+            </a:r>
+            <a:r>
+              <a:rPr lang="en-US" dirty="0"/>
+              <a:t> = 20</a:t>
+            </a:r>
+          </a:p>
+          <a:p>
+            <a:r>
+              <a:rPr lang="en-US" dirty="0" err="1"/>
+              <a:t>m_ball</a:t>
+            </a:r>
+            <a:r>
+              <a:rPr lang="en-US" dirty="0"/>
+              <a:t>  = 1</a:t>
+            </a:r>
+          </a:p>
+          <a:p>
+            <a:r>
+              <a:rPr lang="en-US" dirty="0"/>
+              <a:t>M  = 2</a:t>
+            </a:r>
+          </a:p>
+          <a:p>
+            <a:r>
+              <a:rPr lang="en-US" dirty="0"/>
+              <a:t>R   = 1</a:t>
+            </a:r>
+          </a:p>
+          <a:p>
+            <a:r>
+              <a:rPr lang="en-US" dirty="0"/>
+              <a:t># of collisions = 10^6</a:t>
+            </a:r>
+          </a:p>
+        </p:txBody>
+      </p:sp>
+      <p:sp>
+        <p:nvSpPr>
+          <p:cNvPr id="6" name="TextBox 5">
+            <a:extLst>
+              <a:ext uri="{FF2B5EF4-FFF2-40B4-BE49-F238E27FC236}">
+                <a16:creationId xmlns:a16="http://schemas.microsoft.com/office/drawing/2014/main" id="{0A00ABBA-593F-4E2C-893C-77A6F0CDAAC6}"/>
+              </a:ext>
+            </a:extLst>
+          </p:cNvPr>
+          <p:cNvSpPr txBox="1"/>
+          <p:nvPr/>
+        </p:nvSpPr>
+        <p:spPr>
+          <a:xfrm>
+            <a:off x="4629150" y="119003"/>
+            <a:ext cx="7562850" cy="2492990"/>
+          </a:xfrm>
+          <a:prstGeom prst="rect">
+            <a:avLst/>
+          </a:prstGeom>
+          <a:noFill/>
+        </p:spPr>
+        <p:txBody>
+          <a:bodyPr wrap="square" rtlCol="0">
+            <a:spAutoFit/>
+          </a:bodyPr>
+          <a:lstStyle/>
+          <a:p>
+            <a:r>
+              <a:rPr lang="en-US" dirty="0"/>
+              <a:t>- Equipartition</a:t>
+            </a:r>
+          </a:p>
+          <a:p>
+            <a:r>
+              <a:rPr lang="en-US" dirty="0"/>
+              <a:t>Total energy = 6.278</a:t>
+            </a:r>
+          </a:p>
+          <a:p>
+            <a:r>
+              <a:rPr lang="en-US" dirty="0"/>
+              <a:t>Average energy of container = 0.2851233</a:t>
+            </a:r>
+          </a:p>
+          <a:p>
+            <a:r>
+              <a:rPr lang="en-US" dirty="0"/>
+              <a:t>Average energy of balls = </a:t>
+            </a:r>
+          </a:p>
+          <a:p>
+            <a:r>
+              <a:rPr lang="en-US" sz="1200" dirty="0"/>
+              <a:t>[0.3031514132494766, 0.3007947127825528, 0.2962639900937617, 0.29104294893866683, 0.3077457597407491, </a:t>
+            </a:r>
+          </a:p>
+          <a:p>
+            <a:r>
+              <a:rPr lang="en-US" sz="1200" dirty="0"/>
+              <a:t>0.2929660049782462, 0.29493195931273686, 0.303903045852211, 0.2997228359825988, 0.30007359352179713, </a:t>
+            </a:r>
+          </a:p>
+          <a:p>
+            <a:r>
+              <a:rPr lang="en-US" sz="1200" dirty="0"/>
+              <a:t>0.3033046130930844, 0.30489285565056473, 0.29868093011293656, 0.2983205746795519, 0.29791233007990003, </a:t>
+            </a:r>
+          </a:p>
+          <a:p>
+            <a:r>
+              <a:rPr lang="en-US" sz="1200" dirty="0"/>
+              <a:t>0.29723396404699753, 0.2989222475212646, 0.30219271549325805, 0.30024733702180045, 0.3005834567750671]</a:t>
+            </a:r>
+          </a:p>
+          <a:p>
+            <a:r>
+              <a:rPr lang="en-US" dirty="0"/>
+              <a:t>Decay Rate (</a:t>
+            </a:r>
+            <a:r>
+              <a:rPr lang="el-GR" dirty="0">
+                <a:latin typeface="Calibri" panose="020F0502020204030204" pitchFamily="34" charset="0"/>
+                <a:cs typeface="Calibri" panose="020F0502020204030204" pitchFamily="34" charset="0"/>
+              </a:rPr>
+              <a:t>τ</a:t>
+            </a:r>
+            <a:r>
+              <a:rPr lang="en-US" baseline="30000" dirty="0">
+                <a:latin typeface="Calibri" panose="020F0502020204030204" pitchFamily="34" charset="0"/>
+                <a:cs typeface="Calibri" panose="020F0502020204030204" pitchFamily="34" charset="0"/>
+              </a:rPr>
+              <a:t>-1</a:t>
+            </a:r>
+            <a:r>
+              <a:rPr lang="en-US" dirty="0">
+                <a:latin typeface="Calibri" panose="020F0502020204030204" pitchFamily="34" charset="0"/>
+                <a:cs typeface="Calibri" panose="020F0502020204030204" pitchFamily="34" charset="0"/>
+              </a:rPr>
+              <a:t>)</a:t>
+            </a:r>
+            <a:r>
+              <a:rPr lang="en-US" dirty="0"/>
+              <a:t> = 6.3328</a:t>
+            </a:r>
+          </a:p>
+          <a:p>
+            <a:r>
+              <a:rPr lang="en-US" dirty="0" err="1"/>
+              <a:t>v_rms</a:t>
+            </a:r>
+            <a:r>
+              <a:rPr lang="en-US" dirty="0"/>
+              <a:t> = 0.7741</a:t>
+            </a:r>
+            <a:endParaRPr lang="en-US" sz="1200" dirty="0"/>
+          </a:p>
+        </p:txBody>
+      </p:sp>
+      <p:sp>
+        <p:nvSpPr>
+          <p:cNvPr id="11" name="TextBox 10">
+            <a:extLst>
+              <a:ext uri="{FF2B5EF4-FFF2-40B4-BE49-F238E27FC236}">
+                <a16:creationId xmlns:a16="http://schemas.microsoft.com/office/drawing/2014/main" id="{67DE4481-06B5-4F3C-A351-431497B426EF}"/>
+              </a:ext>
+            </a:extLst>
+          </p:cNvPr>
+          <p:cNvSpPr txBox="1"/>
+          <p:nvPr/>
+        </p:nvSpPr>
+        <p:spPr>
+          <a:xfrm>
+            <a:off x="4449620" y="2488436"/>
+            <a:ext cx="7370905" cy="4247317"/>
+          </a:xfrm>
+          <a:prstGeom prst="rect">
+            <a:avLst/>
+          </a:prstGeom>
+          <a:noFill/>
+        </p:spPr>
+        <p:txBody>
+          <a:bodyPr wrap="square" rtlCol="0">
+            <a:spAutoFit/>
+          </a:bodyPr>
+          <a:lstStyle/>
+          <a:p>
+            <a:r>
+              <a:rPr lang="en-US" sz="900" dirty="0"/>
+              <a:t>[0.   0.01 0.02 0.03 0.04 0.05 0.06 0.07 0.08 0.09 0.1  0.11 0.12 0.13 0.14 0.15 0.16 0.17 0.18 0.19 0.2  0.21 0.22 0.23 0.24 0.25 0.26 0.27</a:t>
+            </a:r>
+          </a:p>
+          <a:p>
+            <a:r>
+              <a:rPr lang="en-US" sz="900" dirty="0"/>
+              <a:t> 0.28 0.29 0.3  0.31 0.32 0.33 0.34 0.35 0.36 0.37 0.38 0.39 0.4  0.41 0.42 0.43 0.44 0.45 0.46 0.47 0.48 0.49 0.5  0.51 0.52 0.53 0.54 0.55</a:t>
+            </a:r>
+          </a:p>
+          <a:p>
+            <a:r>
+              <a:rPr lang="en-US" sz="900" dirty="0"/>
+              <a:t> 0.56 0.57 0.58 0.59 0.6  0.61 0.62 0.63 0.64 0.65 0.66 0.67 0.68 0.69 0.7  0.71 0.72 0.73 0.74 0.75 0.76 0.77 0.78 0.79 0.8  0.81 0.82 0.83</a:t>
+            </a:r>
+          </a:p>
+          <a:p>
+            <a:r>
+              <a:rPr lang="en-US" sz="900" dirty="0"/>
+              <a:t> 0.84 0.85 0.86 0.87 0.88 0.89 0.9  0.91 0.92 0.93 0.94 0.95 0.96 0.97 0.98 0.99]</a:t>
+            </a:r>
+          </a:p>
+          <a:p>
+            <a:r>
+              <a:rPr lang="en-US" sz="900" dirty="0"/>
+              <a:t>[[7.13162103e-02  6.74314191e-02  6.37255829e-02  6.01941493e-02   5.68262490e-02  5.36132201e-02  5.05494091e-02  4.76266912e-02</a:t>
+            </a:r>
+          </a:p>
+          <a:p>
+            <a:r>
+              <a:rPr lang="en-US" sz="900" dirty="0"/>
+              <a:t>   4.48385617e-02  4.21833469e-02  3.96555016e-02  3.72468696e-02   3.49510875e-02  3.27645695e-02  3.06801739e-02  2.86930675e-02</a:t>
+            </a:r>
+          </a:p>
+          <a:p>
+            <a:r>
+              <a:rPr lang="en-US" sz="900" dirty="0"/>
+              <a:t>   2.68002792e-02  2.49961280e-02  2.32785741e-02  2.16457175e-02   2.00905905e-02  1.86115605e-02  1.72032049e-02  1.58600989e-02</a:t>
+            </a:r>
+          </a:p>
+          <a:p>
+            <a:r>
+              <a:rPr lang="en-US" sz="900" dirty="0"/>
+              <a:t>   1.45823492e-02  1.33692239e-02  1.22151688e-02  1.11168832e-02   1.00743283e-02  9.08492323e-03  8.14510195e-03  7.24955702e-03</a:t>
+            </a:r>
+          </a:p>
+          <a:p>
+            <a:r>
+              <a:rPr lang="en-US" sz="900" dirty="0"/>
+              <a:t>   6.39822475e-03  5.59039044e-03  4.82312495e-03  4.09565023e-03   3.40134516e-03  2.74155369e-03  2.11234792e-03  1.51706615e-03</a:t>
+            </a:r>
+          </a:p>
+          <a:p>
+            <a:r>
+              <a:rPr lang="en-US" sz="900" dirty="0"/>
+              <a:t>   9.53989116e-04  4.18755930e-04 -8.82554017e-05 -5.68179879e-04  -1.02213402e-03 -1.45308403e-03 -1.85975497e-03 -2.24521668e-03</a:t>
+            </a:r>
+          </a:p>
+          <a:p>
+            <a:r>
+              <a:rPr lang="en-US" sz="900" dirty="0"/>
+              <a:t>  -2.60938802e-03 -2.95498769e-03 -3.28154332e-03 -3.59278685e-03  -3.88875968e-03 -4.16861614e-03 -4.43450176e-03 -4.68997996e-03</a:t>
+            </a:r>
+          </a:p>
+          <a:p>
+            <a:r>
+              <a:rPr lang="en-US" sz="900" dirty="0"/>
+              <a:t>  -4.92872506e-03 -5.15254294e-03 -5.36458162e-03 -5.56686988e-03  -5.75871975e-03 -5.94038586e-03 -6.11204470e-03 -6.27416486e-03</a:t>
+            </a:r>
+          </a:p>
+          <a:p>
+            <a:r>
+              <a:rPr lang="en-US" sz="900" dirty="0"/>
+              <a:t>  -6.42622967e-03 -6.57126129e-03 -6.70944605e-03 -6.84103820e-03  -6.96521180e-03 -7.08304767e-03 -7.19694487e-03 -7.30688805e-03</a:t>
+            </a:r>
+          </a:p>
+          <a:p>
+            <a:r>
+              <a:rPr lang="en-US" sz="900" dirty="0"/>
+              <a:t>  -7.41213248e-03 -7.51181993e-03 -7.60630670e-03 -7.69714425e-03  -7.78272716e-03 -7.86324366e-03 -7.93799599e-03 -8.00771059e-03</a:t>
+            </a:r>
+          </a:p>
+          <a:p>
+            <a:r>
+              <a:rPr lang="en-US" sz="900" dirty="0"/>
+              <a:t>  -8.07554795e-03 -8.14012597e-03 -8.20183249e-03 -8.26188702e-03  -8.31880870e-03 -8.37019258e-03 -8.41614351e-03 -8.46091159e-03</a:t>
+            </a:r>
+          </a:p>
+          <a:p>
+            <a:r>
+              <a:rPr lang="en-US" sz="900" dirty="0"/>
+              <a:t>  -8.49938963e-03 -8.53462987e-03 -8.56637887e-03 -8.59616708e-03  -8.62919066e-03 -8.66173799e-03 -8.69588630e-03 -8.72956445e-03</a:t>
+            </a:r>
+          </a:p>
+          <a:p>
+            <a:r>
+              <a:rPr lang="en-US" sz="900" dirty="0"/>
+              <a:t>  -8.76176684e-03 -8.79183768e-03 -8.82114401e-03 -8.84843268e-03]</a:t>
+            </a:r>
+          </a:p>
+          <a:p>
+            <a:r>
+              <a:rPr lang="en-US" sz="900" dirty="0"/>
+              <a:t> [7.12454406e-02  6.73578922e-02  6.36503639e-02  6.01158002e-02   5.67471201e-02  5.35359087e-02  5.04731682e-02  4.75532792e-02</a:t>
+            </a:r>
+          </a:p>
+          <a:p>
+            <a:r>
+              <a:rPr lang="en-US" sz="900" dirty="0"/>
+              <a:t>   4.47720548e-02  4.21237496e-02  3.95999545e-02  3.71955368e-02   3.49041646e-02  3.27228816e-02  3.06444400e-02  2.86635670e-02</a:t>
+            </a:r>
+          </a:p>
+          <a:p>
+            <a:r>
+              <a:rPr lang="en-US" sz="900" dirty="0"/>
+              <a:t>   2.67801577e-02  2.49873477e-02  2.32794020e-02  2.16541312e-02   2.01052430e-02  1.86297430e-02  1.72245751e-02  1.58865953e-02</a:t>
+            </a:r>
+          </a:p>
+          <a:p>
+            <a:r>
+              <a:rPr lang="en-US" sz="900" dirty="0"/>
+              <a:t>   1.46120393e-02  1.33973128e-02  1.22425667e-02  1.11449503e-02   1.00993410e-02  9.10620317e-03  8.16195021e-03  7.26664652e-03</a:t>
+            </a:r>
+          </a:p>
+          <a:p>
+            <a:r>
+              <a:rPr lang="en-US" sz="900" dirty="0"/>
+              <a:t>   6.41559216e-03  5.60708182e-03  4.84046101e-03  4.11280020e-03   3.42121274e-03  2.76572645e-03  2.14448316e-03  1.55329585e-03</a:t>
+            </a:r>
+          </a:p>
+          <a:p>
+            <a:r>
+              <a:rPr lang="en-US" sz="900" dirty="0"/>
+              <a:t>   9.90497682e-04  4.58413556e-04 -4.32941699e-05 -5.18244388e-04  -9.70205522e-04 -1.40198410e-03 -1.81214590e-03 -2.20084798e-03</a:t>
+            </a:r>
+          </a:p>
+          <a:p>
+            <a:r>
+              <a:rPr lang="en-US" sz="900" dirty="0"/>
+              <a:t>  -2.56904652e-03 -2.91621987e-03 -3.24430611e-03 -3.55512542e-03  -3.84822876e-03 -4.12472339e-03 -4.38744081e-03 -4.63778992e-03</a:t>
+            </a:r>
+          </a:p>
+          <a:p>
+            <a:r>
+              <a:rPr lang="en-US" sz="900" dirty="0"/>
+              <a:t>  -4.87695625e-03 -5.10598431e-03 -5.32401651e-03 -5.53184494e-03  -5.73156910e-03 -5.91980623e-03 -6.09687862e-03 -6.26604767e-03</a:t>
+            </a:r>
+          </a:p>
+          <a:p>
+            <a:r>
+              <a:rPr lang="en-US" sz="900" dirty="0"/>
+              <a:t>  -6.42772288e-03 -6.58129601e-03 -6.72322127e-03 -6.85566251e-03  -6.98104199e-03 -7.10222236e-03 -7.21829059e-03 -7.32500446e-03</a:t>
+            </a:r>
+          </a:p>
+          <a:p>
+            <a:r>
+              <a:rPr lang="en-US" sz="900" dirty="0"/>
+              <a:t>  -7.42640569e-03 -7.52195532e-03 -7.61218460e-03 -7.69708239e-03  -7.77832382e-03 -7.85651789e-03 -7.93075171e-03 -7.99779983e-03</a:t>
+            </a:r>
+          </a:p>
+          <a:p>
+            <a:r>
+              <a:rPr lang="en-US" sz="900" dirty="0"/>
+              <a:t>  -8.05964498e-03 -8.11853136e-03 -8.17447422e-03 -8.22864688e-03  -8.27773414e-03 -8.32450264e-03 -8.36943610e-03 -8.41200941e-03</a:t>
+            </a:r>
+          </a:p>
+          <a:p>
+            <a:r>
+              <a:rPr lang="en-US" sz="900" dirty="0"/>
+              <a:t>  -8.45377743e-03 -8.49417352e-03 -8.53264079e-03 -8.57065890e-03  -8.60340853e-03 -8.63218583e-03 -8.66001621e-03 -8.68593616e-03</a:t>
+            </a:r>
+          </a:p>
+          <a:p>
+            <a:r>
+              <a:rPr lang="en-US" sz="900" dirty="0"/>
+              <a:t>  -8.70815233e-03 -8.72805679e-03 -8.74470582e-03 -8.75905908e-03]]</a:t>
+            </a:r>
+          </a:p>
+        </p:txBody>
+      </p:sp>
+      <p:sp>
+        <p:nvSpPr>
+          <p:cNvPr id="12" name="TextBox 11">
+            <a:extLst>
+              <a:ext uri="{FF2B5EF4-FFF2-40B4-BE49-F238E27FC236}">
+                <a16:creationId xmlns:a16="http://schemas.microsoft.com/office/drawing/2014/main" id="{0AA8A89B-E3AB-4214-8349-A5D2635A5AF1}"/>
+              </a:ext>
+            </a:extLst>
+          </p:cNvPr>
+          <p:cNvSpPr txBox="1"/>
+          <p:nvPr/>
+        </p:nvSpPr>
+        <p:spPr>
+          <a:xfrm>
+            <a:off x="1394899" y="2956619"/>
+            <a:ext cx="3100721" cy="369332"/>
+          </a:xfrm>
+          <a:prstGeom prst="rect">
+            <a:avLst/>
+          </a:prstGeom>
+          <a:noFill/>
+        </p:spPr>
+        <p:txBody>
+          <a:bodyPr wrap="none" rtlCol="0">
+            <a:spAutoFit/>
+          </a:bodyPr>
+          <a:lstStyle/>
+          <a:p>
+            <a:r>
+              <a:rPr lang="en-US" dirty="0"/>
+              <a:t>Auto-correlation function data:</a:t>
+            </a:r>
+          </a:p>
+        </p:txBody>
+      </p:sp>
+      <p:sp>
+        <p:nvSpPr>
+          <p:cNvPr id="13" name="TextBox 12">
+            <a:extLst>
+              <a:ext uri="{FF2B5EF4-FFF2-40B4-BE49-F238E27FC236}">
+                <a16:creationId xmlns:a16="http://schemas.microsoft.com/office/drawing/2014/main" id="{17EAA925-7198-46C5-8F8B-6B78CB5EE59D}"/>
+              </a:ext>
+            </a:extLst>
+          </p:cNvPr>
+          <p:cNvSpPr txBox="1"/>
+          <p:nvPr/>
+        </p:nvSpPr>
+        <p:spPr>
+          <a:xfrm>
+            <a:off x="642938" y="3919597"/>
+            <a:ext cx="3272114" cy="369332"/>
+          </a:xfrm>
+          <a:prstGeom prst="rect">
+            <a:avLst/>
+          </a:prstGeom>
+          <a:noFill/>
+        </p:spPr>
+        <p:txBody>
+          <a:bodyPr wrap="none" rtlCol="0">
+            <a:spAutoFit/>
+          </a:bodyPr>
+          <a:lstStyle/>
+          <a:p>
+            <a:r>
+              <a:rPr lang="en-US" dirty="0"/>
+              <a:t>Velocity autocorrelation function</a:t>
+            </a:r>
+          </a:p>
+        </p:txBody>
+      </p:sp>
+      <p:sp>
+        <p:nvSpPr>
+          <p:cNvPr id="14" name="TextBox 13">
+            <a:extLst>
+              <a:ext uri="{FF2B5EF4-FFF2-40B4-BE49-F238E27FC236}">
+                <a16:creationId xmlns:a16="http://schemas.microsoft.com/office/drawing/2014/main" id="{5BF6094E-CCE2-4855-98B9-2A6F3DE1673E}"/>
+              </a:ext>
+            </a:extLst>
+          </p:cNvPr>
+          <p:cNvSpPr txBox="1"/>
+          <p:nvPr/>
+        </p:nvSpPr>
+        <p:spPr>
+          <a:xfrm>
+            <a:off x="8696325" y="119003"/>
+            <a:ext cx="2026517" cy="369332"/>
+          </a:xfrm>
+          <a:prstGeom prst="rect">
+            <a:avLst/>
+          </a:prstGeom>
+          <a:noFill/>
+        </p:spPr>
+        <p:txBody>
+          <a:bodyPr wrap="none" rtlCol="0">
+            <a:spAutoFit/>
+          </a:bodyPr>
+          <a:lstStyle/>
+          <a:p>
+            <a:r>
+              <a:rPr lang="en-US" dirty="0"/>
+              <a:t>N </a:t>
+            </a:r>
+            <a:r>
+              <a:rPr lang="el-GR" dirty="0">
+                <a:latin typeface="Calibri" panose="020F0502020204030204" pitchFamily="34" charset="0"/>
+                <a:cs typeface="Calibri" panose="020F0502020204030204" pitchFamily="34" charset="0"/>
+              </a:rPr>
+              <a:t>τ</a:t>
+            </a:r>
+            <a:r>
+              <a:rPr lang="en-US" dirty="0">
+                <a:latin typeface="Calibri" panose="020F0502020204030204" pitchFamily="34" charset="0"/>
+                <a:cs typeface="Calibri" panose="020F0502020204030204" pitchFamily="34" charset="0"/>
+              </a:rPr>
+              <a:t> (</a:t>
+            </a:r>
+            <a:r>
+              <a:rPr lang="en-US" dirty="0" err="1"/>
+              <a:t>v</a:t>
+            </a:r>
+            <a:r>
+              <a:rPr lang="en-US" baseline="-25000" dirty="0" err="1"/>
+              <a:t>rms</a:t>
+            </a:r>
+            <a:r>
+              <a:rPr lang="en-US" dirty="0"/>
+              <a:t>/R) =  2.436</a:t>
+            </a:r>
+          </a:p>
+        </p:txBody>
+      </p:sp>
+    </p:spTree>
+    <p:extLst>
+      <p:ext uri="{BB962C8B-B14F-4D97-AF65-F5344CB8AC3E}">
+        <p14:creationId xmlns:p14="http://schemas.microsoft.com/office/powerpoint/2010/main" val="3402405174"/>
+      </p:ext>
+    </p:extLst>
+  </p:cSld>
+  <p:clrMapOvr>
+    <a:masterClrMapping/>
+  </p:clrMapOvr>
+</p:sld>
+</file>
+
+<file path=ppt/slides/slide4.xml><?xml version="1.0" encoding="utf-8"?>
+<p:sld xmlns:a="http://schemas.openxmlformats.org/drawingml/2006/main" xmlns:r="http://schemas.openxmlformats.org/officeDocument/2006/relationships" xmlns:p="http://schemas.openxmlformats.org/presentationml/2006/main">
+  <p:cSld>
+    <p:spTree>
+      <p:nvGrpSpPr>
+        <p:cNvPr id="1" name=""/>
+        <p:cNvGrpSpPr/>
+        <p:nvPr/>
+      </p:nvGrpSpPr>
+      <p:grpSpPr>
+        <a:xfrm>
+          <a:off x="0" y="0"/>
+          <a:ext cx="0" cy="0"/>
+          <a:chOff x="0" y="0"/>
+          <a:chExt cx="0" cy="0"/>
+        </a:xfrm>
+      </p:grpSpPr>
+      <p:sp>
+        <p:nvSpPr>
+          <p:cNvPr id="4" name="TextBox 3">
+            <a:extLst>
+              <a:ext uri="{FF2B5EF4-FFF2-40B4-BE49-F238E27FC236}">
+                <a16:creationId xmlns:a16="http://schemas.microsoft.com/office/drawing/2014/main" id="{66E16E74-FD64-4056-A5E6-2B5958673682}"/>
+              </a:ext>
+            </a:extLst>
+          </p:cNvPr>
+          <p:cNvSpPr txBox="1"/>
+          <p:nvPr/>
+        </p:nvSpPr>
+        <p:spPr>
+          <a:xfrm>
+            <a:off x="642938" y="542925"/>
+            <a:ext cx="1642566" cy="369332"/>
+          </a:xfrm>
+          <a:prstGeom prst="rect">
+            <a:avLst/>
+          </a:prstGeom>
+          <a:noFill/>
+        </p:spPr>
+        <p:txBody>
+          <a:bodyPr wrap="none" rtlCol="0">
+            <a:spAutoFit/>
+          </a:bodyPr>
+          <a:lstStyle/>
+          <a:p>
+            <a:r>
+              <a:rPr lang="en-US" dirty="0"/>
+              <a:t>Results on 9/19</a:t>
+            </a:r>
+          </a:p>
+        </p:txBody>
+      </p:sp>
+      <p:sp>
+        <p:nvSpPr>
+          <p:cNvPr id="5" name="TextBox 4">
+            <a:extLst>
+              <a:ext uri="{FF2B5EF4-FFF2-40B4-BE49-F238E27FC236}">
+                <a16:creationId xmlns:a16="http://schemas.microsoft.com/office/drawing/2014/main" id="{9EB1C12E-A12B-43D5-91EC-D475E95D5691}"/>
+              </a:ext>
+            </a:extLst>
+          </p:cNvPr>
+          <p:cNvSpPr txBox="1"/>
+          <p:nvPr/>
+        </p:nvSpPr>
+        <p:spPr>
+          <a:xfrm>
+            <a:off x="642938" y="1057275"/>
+            <a:ext cx="2138406" cy="1754326"/>
+          </a:xfrm>
+          <a:prstGeom prst="rect">
+            <a:avLst/>
+          </a:prstGeom>
+          <a:noFill/>
+        </p:spPr>
+        <p:txBody>
+          <a:bodyPr wrap="none" rtlCol="0">
+            <a:spAutoFit/>
+          </a:bodyPr>
+          <a:lstStyle/>
+          <a:p>
+            <a:r>
+              <a:rPr lang="en-US" dirty="0"/>
+              <a:t>Parameters:</a:t>
+            </a:r>
+          </a:p>
+          <a:p>
+            <a:r>
+              <a:rPr lang="en-US" dirty="0" err="1"/>
+              <a:t>N_balls</a:t>
+            </a:r>
+            <a:r>
+              <a:rPr lang="en-US" dirty="0"/>
+              <a:t> = 20</a:t>
+            </a:r>
+          </a:p>
+          <a:p>
+            <a:r>
+              <a:rPr lang="en-US" dirty="0" err="1"/>
+              <a:t>m_ball</a:t>
+            </a:r>
+            <a:r>
+              <a:rPr lang="en-US" dirty="0"/>
+              <a:t>  = 1</a:t>
+            </a:r>
+          </a:p>
+          <a:p>
+            <a:r>
+              <a:rPr lang="en-US" dirty="0"/>
+              <a:t>M  = 2</a:t>
+            </a:r>
+          </a:p>
+          <a:p>
+            <a:r>
+              <a:rPr lang="en-US" dirty="0"/>
+              <a:t>R   = 1</a:t>
+            </a:r>
+          </a:p>
+          <a:p>
+            <a:r>
+              <a:rPr lang="en-US" dirty="0"/>
+              <a:t># of collisions = 10^6</a:t>
+            </a:r>
+          </a:p>
+        </p:txBody>
+      </p:sp>
+      <p:sp>
+        <p:nvSpPr>
+          <p:cNvPr id="6" name="TextBox 5">
+            <a:extLst>
+              <a:ext uri="{FF2B5EF4-FFF2-40B4-BE49-F238E27FC236}">
+                <a16:creationId xmlns:a16="http://schemas.microsoft.com/office/drawing/2014/main" id="{0A00ABBA-593F-4E2C-893C-77A6F0CDAAC6}"/>
+              </a:ext>
+            </a:extLst>
+          </p:cNvPr>
+          <p:cNvSpPr txBox="1"/>
+          <p:nvPr/>
+        </p:nvSpPr>
+        <p:spPr>
+          <a:xfrm>
+            <a:off x="4629150" y="119003"/>
+            <a:ext cx="7562850" cy="2492990"/>
+          </a:xfrm>
+          <a:prstGeom prst="rect">
+            <a:avLst/>
+          </a:prstGeom>
+          <a:noFill/>
+        </p:spPr>
+        <p:txBody>
+          <a:bodyPr wrap="square" rtlCol="0">
+            <a:spAutoFit/>
+          </a:bodyPr>
+          <a:lstStyle/>
+          <a:p>
+            <a:r>
+              <a:rPr lang="en-US" dirty="0"/>
+              <a:t>- Equipartition</a:t>
+            </a:r>
+          </a:p>
+          <a:p>
+            <a:r>
+              <a:rPr lang="en-US" dirty="0"/>
+              <a:t>Total energy = 176.0942</a:t>
+            </a:r>
+          </a:p>
+          <a:p>
+            <a:r>
+              <a:rPr lang="en-US" dirty="0"/>
+              <a:t>Average energy of container = 8.0931</a:t>
+            </a:r>
+          </a:p>
+          <a:p>
+            <a:r>
+              <a:rPr lang="en-US" dirty="0"/>
+              <a:t>Average energy of balls = </a:t>
+            </a:r>
+          </a:p>
+          <a:p>
+            <a:r>
+              <a:rPr lang="en-US" sz="1200" dirty="0"/>
+              <a:t>[8.368032420504829, 8.380599513378446, 8.495261131694575, 8.323890486833017, 8.479573496391103, 8.279880530304526, 8.404243191105126, 8.536590439220323, 8.154400391139061, 8.390976003063058, 8.392146789174417, 8.450824137917657, 8.462955334997902, 8.389596156286801, 8.476318389990839, 8.297257205449206, 8.472147027947017, 8.486010308449663, 8.327963079547407, 8.432432633359317]</a:t>
+            </a:r>
+          </a:p>
+          <a:p>
+            <a:r>
+              <a:rPr lang="en-US" dirty="0"/>
+              <a:t>Decay Rate (</a:t>
+            </a:r>
+            <a:r>
+              <a:rPr lang="el-GR" dirty="0">
+                <a:latin typeface="Calibri" panose="020F0502020204030204" pitchFamily="34" charset="0"/>
+                <a:cs typeface="Calibri" panose="020F0502020204030204" pitchFamily="34" charset="0"/>
+              </a:rPr>
+              <a:t>τ</a:t>
+            </a:r>
+            <a:r>
+              <a:rPr lang="en-US" baseline="30000" dirty="0">
+                <a:latin typeface="Calibri" panose="020F0502020204030204" pitchFamily="34" charset="0"/>
+                <a:cs typeface="Calibri" panose="020F0502020204030204" pitchFamily="34" charset="0"/>
+              </a:rPr>
+              <a:t>-1</a:t>
+            </a:r>
+            <a:r>
+              <a:rPr lang="en-US" dirty="0">
+                <a:latin typeface="Calibri" panose="020F0502020204030204" pitchFamily="34" charset="0"/>
+                <a:cs typeface="Calibri" panose="020F0502020204030204" pitchFamily="34" charset="0"/>
+              </a:rPr>
+              <a:t>)</a:t>
+            </a:r>
+            <a:r>
+              <a:rPr lang="en-US" dirty="0"/>
+              <a:t> = 32.5</a:t>
+            </a:r>
+          </a:p>
+          <a:p>
+            <a:r>
+              <a:rPr lang="en-US" dirty="0" err="1"/>
+              <a:t>v_rms</a:t>
+            </a:r>
+            <a:r>
+              <a:rPr lang="en-US" dirty="0"/>
+              <a:t> = 4.1</a:t>
+            </a:r>
+            <a:endParaRPr lang="en-US" sz="1200" dirty="0"/>
+          </a:p>
+        </p:txBody>
+      </p:sp>
+      <p:sp>
+        <p:nvSpPr>
+          <p:cNvPr id="11" name="TextBox 10">
+            <a:extLst>
+              <a:ext uri="{FF2B5EF4-FFF2-40B4-BE49-F238E27FC236}">
+                <a16:creationId xmlns:a16="http://schemas.microsoft.com/office/drawing/2014/main" id="{67DE4481-06B5-4F3C-A351-431497B426EF}"/>
+              </a:ext>
+            </a:extLst>
+          </p:cNvPr>
+          <p:cNvSpPr txBox="1"/>
+          <p:nvPr/>
+        </p:nvSpPr>
+        <p:spPr>
+          <a:xfrm>
+            <a:off x="4449620" y="2488436"/>
+            <a:ext cx="7370905" cy="4247317"/>
+          </a:xfrm>
+          <a:prstGeom prst="rect">
+            <a:avLst/>
+          </a:prstGeom>
+          <a:noFill/>
+        </p:spPr>
+        <p:txBody>
+          <a:bodyPr wrap="square" rtlCol="0">
+            <a:spAutoFit/>
+          </a:bodyPr>
+          <a:lstStyle/>
+          <a:p>
+            <a:r>
+              <a:rPr lang="en-US" sz="900" dirty="0"/>
+              <a:t>[0.   0.01 0.02 0.03 0.04 0.05 0.06 0.07 0.08 0.09 0.1  0.11 0.12 0.13 0.14 0.15 0.16 0.17 0.18 0.19 0.2  0.21 0.22 0.23 0.24 0.25 0.26 0.27</a:t>
+            </a:r>
+          </a:p>
+          <a:p>
+            <a:r>
+              <a:rPr lang="en-US" sz="900" dirty="0"/>
+              <a:t> 0.28 0.29 0.3  0.31 0.32 0.33 0.34 0.35 0.36 0.37 0.38 0.39 0.4  0.41 0.42 0.43 0.44 0.45 0.46 0.47 0.48 0.49 0.5  0.51 0.52 0.53 0.54 0.55</a:t>
+            </a:r>
+          </a:p>
+          <a:p>
+            <a:r>
+              <a:rPr lang="en-US" sz="900" dirty="0"/>
+              <a:t> 0.56 0.57 0.58 0.59 0.6  0.61 0.62 0.63 0.64 0.65 0.66 0.67 0.68 0.69 0.7  0.71 0.72 0.73 0.74 0.75 0.76 0.77 0.78 0.79 0.8  0.81 0.82 0.83</a:t>
+            </a:r>
+          </a:p>
+          <a:p>
+            <a:r>
+              <a:rPr lang="en-US" sz="900" dirty="0"/>
+              <a:t> 0.84 0.85 0.86 0.87 0.88 0.89 0.9  0.91 0.92 0.93 0.94 0.95 0.96 0.97 0.98 0.99]</a:t>
+            </a:r>
+          </a:p>
+          <a:p>
+            <a:r>
+              <a:rPr lang="en-US" sz="900" dirty="0"/>
+              <a:t>[[2.02270899e+00  1.49662841e+00  1.08816646e+00  7.70415611e-01   5.24575326e-01  3.35358081e-01  1.89982275e-01  7.85662738e-02</a:t>
+            </a:r>
+          </a:p>
+          <a:p>
+            <a:r>
+              <a:rPr lang="en-US" sz="900" dirty="0"/>
+              <a:t>  -6.55048342e-03 -7.15258665e-02 -1.20781798e-01 -1.58245579e-01  -1.86035027e-01 -2.07064719e-01 -2.22282027e-01 -2.33099789e-01</a:t>
+            </a:r>
+          </a:p>
+          <a:p>
+            <a:r>
+              <a:rPr lang="en-US" sz="900" dirty="0"/>
+              <a:t>  -2.40665459e-01 -2.45625544e-01 -2.48891560e-01 -2.50964075e-01  -2.52105683e-01 -2.52036868e-01 -2.50483849e-01 -2.47282583e-01</a:t>
+            </a:r>
+          </a:p>
+          <a:p>
+            <a:r>
+              <a:rPr lang="en-US" sz="900" dirty="0"/>
+              <a:t>  -2.41849024e-01 -2.35897553e-01 -2.28638923e-01 -2.19910729e-01  -2.09187562e-01 -1.96599845e-01 -1.82038229e-01 -1.67062756e-01</a:t>
+            </a:r>
+          </a:p>
+          <a:p>
+            <a:r>
+              <a:rPr lang="en-US" sz="900" dirty="0"/>
+              <a:t>  -1.50734731e-01 -1.33744241e-01 -1.16424976e-01 -9.96546301e-02  -8.42617541e-02 -7.00393375e-02 -5.64359916e-02 -4.32433471e-02</a:t>
+            </a:r>
+          </a:p>
+          <a:p>
+            <a:r>
+              <a:rPr lang="en-US" sz="900" dirty="0"/>
+              <a:t>  -3.15750775e-02 -2.10318805e-02 -1.15866574e-02 -3.12594058e-03   4.81184977e-03  1.11438136e-02  1.63560886e-02  2.08631735e-02</a:t>
+            </a:r>
+          </a:p>
+          <a:p>
+            <a:r>
+              <a:rPr lang="en-US" sz="900" dirty="0"/>
+              <a:t>   2.35449174e-02  2.54634433e-02  2.66197073e-02  2.67547364e-02   2.71151983e-02  2.71829988e-02  2.68239998e-02  2.58033032e-02</a:t>
+            </a:r>
+          </a:p>
+          <a:p>
+            <a:r>
+              <a:rPr lang="en-US" sz="900" dirty="0"/>
+              <a:t>   2.41904357e-02  2.10843167e-02  1.80303550e-02  1.43933607e-02   1.08473033e-02  7.74474165e-03  5.15598263e-03  2.15749544e-03</a:t>
+            </a:r>
+          </a:p>
+          <a:p>
+            <a:r>
+              <a:rPr lang="en-US" sz="900" dirty="0"/>
+              <a:t>   6.56338832e-05 -2.06791856e-03 -3.42474663e-03 -3.87963355e-03  -3.93357377e-03 -3.79558290e-03 -2.77059479e-03 -1.89744243e-03</a:t>
+            </a:r>
+          </a:p>
+          <a:p>
+            <a:r>
+              <a:rPr lang="en-US" sz="900" dirty="0"/>
+              <a:t>  -1.38304118e-03 -6.23886319e-04 -2.36116707e-04  1.38297357e-04   2.69333301e-05  9.41136373e-06  4.79762460e-04  6.62636916e-04</a:t>
+            </a:r>
+          </a:p>
+          <a:p>
+            <a:r>
+              <a:rPr lang="en-US" sz="900" dirty="0"/>
+              <a:t>   1.09497855e-03  1.80749377e-03  2.55127149e-03  3.01625365e-03   2.54583884e-03  1.63313939e-03  9.97297766e-04  9.27666554e-04</a:t>
+            </a:r>
+          </a:p>
+          <a:p>
+            <a:r>
+              <a:rPr lang="en-US" sz="900" dirty="0"/>
+              <a:t>   3.46622258e-04  8.28743281e-04  7.21119799e-04  6.25039181e-04   7.23821904e-04  1.32909408e-03  1.06225839e-03 -4.14037957e-04</a:t>
+            </a:r>
+          </a:p>
+          <a:p>
+            <a:r>
+              <a:rPr lang="en-US" sz="900" dirty="0"/>
+              <a:t>  -1.41776460e-03 -1.86527885e-03 -2.99228111e-03 -3.45410108e-03]</a:t>
+            </a:r>
+          </a:p>
+          <a:p>
+            <a:r>
+              <a:rPr lang="en-US" sz="900" dirty="0"/>
+              <a:t> [2.02383148e+00  1.49810099e+00  1.08904651e+00  7.71552668e-01   5.26884629e-01  3.38558046e-01  1.92777424e-01  8.07348972e-02</a:t>
+            </a:r>
+          </a:p>
+          <a:p>
+            <a:r>
+              <a:rPr lang="en-US" sz="900" dirty="0"/>
+              <a:t>  -4.47966585e-03 -6.91938717e-02 -1.18751344e-01 -1.56705785e-01  -1.84721718e-01 -2.05584798e-01 -2.20296401e-01 -2.31494327e-01</a:t>
+            </a:r>
+          </a:p>
+          <a:p>
+            <a:r>
+              <a:rPr lang="en-US" sz="900" dirty="0"/>
+              <a:t>  -2.40060636e-01 -2.45817636e-01 -2.49802130e-01 -2.52277637e-01  -2.53489649e-01 -2.54100388e-01 -2.54682853e-01 -2.53643374e-01</a:t>
+            </a:r>
+          </a:p>
+          <a:p>
+            <a:r>
+              <a:rPr lang="en-US" sz="900" dirty="0"/>
+              <a:t>  -2.50646692e-01 -2.45509692e-01 -2.37493484e-01 -2.26758137e-01  -2.14524767e-01 -2.00180527e-01 -1.84664987e-01 -1.67590444e-01</a:t>
+            </a:r>
+          </a:p>
+          <a:p>
+            <a:r>
+              <a:rPr lang="en-US" sz="900" dirty="0"/>
+              <a:t>  -1.50613140e-01 -1.33914740e-01 -1.16948569e-01 -1.00176043e-01  -8.39740149e-02 -6.83675804e-02 -5.44492397e-02 -4.15512486e-02</a:t>
+            </a:r>
+          </a:p>
+          <a:p>
+            <a:r>
+              <a:rPr lang="en-US" sz="900" dirty="0"/>
+              <a:t>  -2.95542670e-02 -1.96477473e-02 -9.96439739e-03 -2.64059769e-04   8.09620797e-03  1.46616567e-02  1.91719708e-02  2.31217342e-02</a:t>
+            </a:r>
+          </a:p>
+          <a:p>
+            <a:r>
+              <a:rPr lang="en-US" sz="900" dirty="0"/>
+              <a:t>   2.58987627e-02  2.69810095e-02  2.69892477e-02  2.67978905e-02   2.64848484e-02  2.65081174e-02  2.46201950e-02  2.18503175e-02</a:t>
+            </a:r>
+          </a:p>
+          <a:p>
+            <a:r>
+              <a:rPr lang="en-US" sz="900" dirty="0"/>
+              <a:t>   1.88590732e-02  1.61623968e-02  1.45331259e-02  1.35591026e-02   1.31773470e-02  1.20483467e-02  1.03771330e-02  8.28123176e-03</a:t>
+            </a:r>
+          </a:p>
+          <a:p>
+            <a:r>
+              <a:rPr lang="en-US" sz="900" dirty="0"/>
+              <a:t>   6.49342205e-03  4.86664577e-03  2.85889065e-03  1.04086474e-03  -2.30659352e-04 -1.01043555e-03 -1.04823095e-03 -1.72463787e-04</a:t>
+            </a:r>
+          </a:p>
+          <a:p>
+            <a:r>
+              <a:rPr lang="en-US" sz="900" dirty="0"/>
+              <a:t>  -2.98765806e-05 -6.91637391e-04 -1.54843594e-03 -2.09689216e-03  -2.36061648e-03 -2.36841916e-03 -2.60740677e-03 -2.37668335e-03</a:t>
+            </a:r>
+          </a:p>
+          <a:p>
+            <a:r>
+              <a:rPr lang="en-US" sz="900" dirty="0"/>
+              <a:t>  -1.62903604e-03 -6.10610804e-04  2.35056940e-05 -1.55830468e-07  -4.51983140e-04 -1.01084185e-03 -1.04580640e-03 -1.51941562e-03</a:t>
+            </a:r>
+          </a:p>
+          <a:p>
+            <a:r>
+              <a:rPr lang="en-US" sz="900" dirty="0"/>
+              <a:t>  -1.58499762e-03 -7.24325338e-04 -3.46604900e-04 -4.83972182e-04  -4.31322869e-04 -1.55056937e-03 -2.49374054e-03 -3.46099288e-03</a:t>
+            </a:r>
+          </a:p>
+          <a:p>
+            <a:r>
+              <a:rPr lang="en-US" sz="900" dirty="0"/>
+              <a:t>  -3.85208951e-03 -4.03668653e-03 -3.22285949e-03 -3.00228465e-03]]</a:t>
+            </a:r>
+          </a:p>
+        </p:txBody>
+      </p:sp>
+      <p:sp>
+        <p:nvSpPr>
+          <p:cNvPr id="12" name="TextBox 11">
+            <a:extLst>
+              <a:ext uri="{FF2B5EF4-FFF2-40B4-BE49-F238E27FC236}">
+                <a16:creationId xmlns:a16="http://schemas.microsoft.com/office/drawing/2014/main" id="{0AA8A89B-E3AB-4214-8349-A5D2635A5AF1}"/>
+              </a:ext>
+            </a:extLst>
+          </p:cNvPr>
+          <p:cNvSpPr txBox="1"/>
+          <p:nvPr/>
+        </p:nvSpPr>
+        <p:spPr>
+          <a:xfrm>
+            <a:off x="1394899" y="2956619"/>
+            <a:ext cx="3100721" cy="369332"/>
+          </a:xfrm>
+          <a:prstGeom prst="rect">
+            <a:avLst/>
+          </a:prstGeom>
+          <a:noFill/>
+        </p:spPr>
+        <p:txBody>
+          <a:bodyPr wrap="none" rtlCol="0">
+            <a:spAutoFit/>
+          </a:bodyPr>
+          <a:lstStyle/>
+          <a:p>
+            <a:r>
+              <a:rPr lang="en-US" dirty="0"/>
+              <a:t>Auto-correlation function data:</a:t>
+            </a:r>
+          </a:p>
+        </p:txBody>
+      </p:sp>
+      <p:sp>
+        <p:nvSpPr>
+          <p:cNvPr id="13" name="TextBox 12">
+            <a:extLst>
+              <a:ext uri="{FF2B5EF4-FFF2-40B4-BE49-F238E27FC236}">
+                <a16:creationId xmlns:a16="http://schemas.microsoft.com/office/drawing/2014/main" id="{17EAA925-7198-46C5-8F8B-6B78CB5EE59D}"/>
+              </a:ext>
+            </a:extLst>
+          </p:cNvPr>
+          <p:cNvSpPr txBox="1"/>
+          <p:nvPr/>
+        </p:nvSpPr>
+        <p:spPr>
+          <a:xfrm>
+            <a:off x="642938" y="3919597"/>
+            <a:ext cx="3272114" cy="369332"/>
+          </a:xfrm>
+          <a:prstGeom prst="rect">
+            <a:avLst/>
+          </a:prstGeom>
+          <a:noFill/>
+        </p:spPr>
+        <p:txBody>
+          <a:bodyPr wrap="none" rtlCol="0">
+            <a:spAutoFit/>
+          </a:bodyPr>
+          <a:lstStyle/>
+          <a:p>
+            <a:r>
+              <a:rPr lang="en-US" dirty="0"/>
+              <a:t>Velocity autocorrelation function</a:t>
+            </a:r>
+          </a:p>
+        </p:txBody>
+      </p:sp>
+      <p:pic>
+        <p:nvPicPr>
+          <p:cNvPr id="7" name="Picture 6">
+            <a:extLst>
+              <a:ext uri="{FF2B5EF4-FFF2-40B4-BE49-F238E27FC236}">
+                <a16:creationId xmlns:a16="http://schemas.microsoft.com/office/drawing/2014/main" id="{BA78BE89-E0BD-45DD-A9D7-F44E69740DCF}"/>
+              </a:ext>
+            </a:extLst>
+          </p:cNvPr>
+          <p:cNvPicPr>
+            <a:picLocks noChangeAspect="1"/>
+          </p:cNvPicPr>
+          <p:nvPr/>
+        </p:nvPicPr>
+        <p:blipFill>
+          <a:blip r:embed="rId2"/>
+          <a:stretch>
+            <a:fillRect/>
+          </a:stretch>
+        </p:blipFill>
+        <p:spPr>
+          <a:xfrm>
+            <a:off x="690563" y="4288929"/>
+            <a:ext cx="3555697" cy="2404944"/>
+          </a:xfrm>
+          <a:prstGeom prst="rect">
+            <a:avLst/>
+          </a:prstGeom>
+        </p:spPr>
+      </p:pic>
+      <p:sp>
+        <p:nvSpPr>
+          <p:cNvPr id="10" name="TextBox 9">
+            <a:extLst>
+              <a:ext uri="{FF2B5EF4-FFF2-40B4-BE49-F238E27FC236}">
+                <a16:creationId xmlns:a16="http://schemas.microsoft.com/office/drawing/2014/main" id="{A02198BD-8815-4206-B4B9-3C945906259A}"/>
+              </a:ext>
+            </a:extLst>
+          </p:cNvPr>
+          <p:cNvSpPr txBox="1"/>
+          <p:nvPr/>
+        </p:nvSpPr>
+        <p:spPr>
+          <a:xfrm>
+            <a:off x="8696325" y="119003"/>
+            <a:ext cx="2026517" cy="369332"/>
+          </a:xfrm>
+          <a:prstGeom prst="rect">
+            <a:avLst/>
+          </a:prstGeom>
+          <a:noFill/>
+        </p:spPr>
+        <p:txBody>
+          <a:bodyPr wrap="none" rtlCol="0">
+            <a:spAutoFit/>
+          </a:bodyPr>
+          <a:lstStyle/>
+          <a:p>
+            <a:r>
+              <a:rPr lang="en-US" dirty="0"/>
+              <a:t>N </a:t>
+            </a:r>
+            <a:r>
+              <a:rPr lang="el-GR" dirty="0">
+                <a:latin typeface="Calibri" panose="020F0502020204030204" pitchFamily="34" charset="0"/>
+                <a:cs typeface="Calibri" panose="020F0502020204030204" pitchFamily="34" charset="0"/>
+              </a:rPr>
+              <a:t>τ</a:t>
+            </a:r>
+            <a:r>
+              <a:rPr lang="en-US" dirty="0">
+                <a:latin typeface="Calibri" panose="020F0502020204030204" pitchFamily="34" charset="0"/>
+                <a:cs typeface="Calibri" panose="020F0502020204030204" pitchFamily="34" charset="0"/>
+              </a:rPr>
+              <a:t> (</a:t>
+            </a:r>
+            <a:r>
+              <a:rPr lang="en-US" dirty="0" err="1"/>
+              <a:t>v</a:t>
+            </a:r>
+            <a:r>
+              <a:rPr lang="en-US" baseline="-25000" dirty="0" err="1"/>
+              <a:t>rms</a:t>
+            </a:r>
+            <a:r>
+              <a:rPr lang="en-US" dirty="0"/>
+              <a:t>/R) =  2.523</a:t>
+            </a:r>
+          </a:p>
+        </p:txBody>
+      </p:sp>
+    </p:spTree>
+    <p:extLst>
+      <p:ext uri="{BB962C8B-B14F-4D97-AF65-F5344CB8AC3E}">
+        <p14:creationId xmlns:p14="http://schemas.microsoft.com/office/powerpoint/2010/main" val="1203993214"/>
       </p:ext>
     </p:extLst>
   </p:cSld>

</xml_diff>